<commit_message>
Hat Game presentation fixed
</commit_message>
<xml_diff>
--- a/444/demyanenko_popov_sobolev/presentation.pptx
+++ b/444/demyanenko_popov_sobolev/presentation.pptx
@@ -109,6 +109,22 @@
       </a:defRPr>
     </a:lvl9pPr>
   </p:defaultTextStyle>
+  <p:extLst>
+    <p:ext uri="{EFAFB233-063F-42B5-8137-9DF3F51BA10A}">
+      <p15:sldGuideLst xmlns:p15="http://schemas.microsoft.com/office/powerpoint/2012/main">
+        <p15:guide id="1" orient="horz" pos="2160">
+          <p15:clr>
+            <a:srgbClr val="A4A3A4"/>
+          </p15:clr>
+        </p15:guide>
+        <p15:guide id="2" pos="2880">
+          <p15:clr>
+            <a:srgbClr val="A4A3A4"/>
+          </p15:clr>
+        </p15:guide>
+      </p15:sldGuideLst>
+    </p:ext>
+  </p:extLst>
 </p:presentation>
 </file>
 
@@ -293,7 +309,7 @@
           <a:p>
             <a:fld id="{422E2696-A770-42C1-A308-056B4A80F85B}" type="datetimeFigureOut">
               <a:rPr lang="ru-RU" smtClean="0"/>
-              <a:t>10.12.2013</a:t>
+              <a:t>11.05.2014</a:t>
             </a:fld>
             <a:endParaRPr lang="ru-RU"/>
           </a:p>
@@ -458,7 +474,7 @@
           <a:p>
             <a:fld id="{422E2696-A770-42C1-A308-056B4A80F85B}" type="datetimeFigureOut">
               <a:rPr lang="ru-RU" smtClean="0"/>
-              <a:t>10.12.2013</a:t>
+              <a:t>11.05.2014</a:t>
             </a:fld>
             <a:endParaRPr lang="ru-RU"/>
           </a:p>
@@ -633,7 +649,7 @@
           <a:p>
             <a:fld id="{422E2696-A770-42C1-A308-056B4A80F85B}" type="datetimeFigureOut">
               <a:rPr lang="ru-RU" smtClean="0"/>
-              <a:t>10.12.2013</a:t>
+              <a:t>11.05.2014</a:t>
             </a:fld>
             <a:endParaRPr lang="ru-RU"/>
           </a:p>
@@ -798,7 +814,7 @@
           <a:p>
             <a:fld id="{422E2696-A770-42C1-A308-056B4A80F85B}" type="datetimeFigureOut">
               <a:rPr lang="ru-RU" smtClean="0"/>
-              <a:t>10.12.2013</a:t>
+              <a:t>11.05.2014</a:t>
             </a:fld>
             <a:endParaRPr lang="ru-RU"/>
           </a:p>
@@ -1039,7 +1055,7 @@
           <a:p>
             <a:fld id="{422E2696-A770-42C1-A308-056B4A80F85B}" type="datetimeFigureOut">
               <a:rPr lang="ru-RU" smtClean="0"/>
-              <a:t>10.12.2013</a:t>
+              <a:t>11.05.2014</a:t>
             </a:fld>
             <a:endParaRPr lang="ru-RU"/>
           </a:p>
@@ -1322,7 +1338,7 @@
           <a:p>
             <a:fld id="{422E2696-A770-42C1-A308-056B4A80F85B}" type="datetimeFigureOut">
               <a:rPr lang="ru-RU" smtClean="0"/>
-              <a:t>10.12.2013</a:t>
+              <a:t>11.05.2014</a:t>
             </a:fld>
             <a:endParaRPr lang="ru-RU"/>
           </a:p>
@@ -1739,7 +1755,7 @@
           <a:p>
             <a:fld id="{422E2696-A770-42C1-A308-056B4A80F85B}" type="datetimeFigureOut">
               <a:rPr lang="ru-RU" smtClean="0"/>
-              <a:t>10.12.2013</a:t>
+              <a:t>11.05.2014</a:t>
             </a:fld>
             <a:endParaRPr lang="ru-RU"/>
           </a:p>
@@ -1852,7 +1868,7 @@
           <a:p>
             <a:fld id="{422E2696-A770-42C1-A308-056B4A80F85B}" type="datetimeFigureOut">
               <a:rPr lang="ru-RU" smtClean="0"/>
-              <a:t>10.12.2013</a:t>
+              <a:t>11.05.2014</a:t>
             </a:fld>
             <a:endParaRPr lang="ru-RU"/>
           </a:p>
@@ -1942,7 +1958,7 @@
           <a:p>
             <a:fld id="{422E2696-A770-42C1-A308-056B4A80F85B}" type="datetimeFigureOut">
               <a:rPr lang="ru-RU" smtClean="0"/>
-              <a:t>10.12.2013</a:t>
+              <a:t>11.05.2014</a:t>
             </a:fld>
             <a:endParaRPr lang="ru-RU"/>
           </a:p>
@@ -2214,7 +2230,7 @@
           <a:p>
             <a:fld id="{422E2696-A770-42C1-A308-056B4A80F85B}" type="datetimeFigureOut">
               <a:rPr lang="ru-RU" smtClean="0"/>
-              <a:t>10.12.2013</a:t>
+              <a:t>11.05.2014</a:t>
             </a:fld>
             <a:endParaRPr lang="ru-RU"/>
           </a:p>
@@ -2462,7 +2478,7 @@
           <a:p>
             <a:fld id="{422E2696-A770-42C1-A308-056B4A80F85B}" type="datetimeFigureOut">
               <a:rPr lang="ru-RU" smtClean="0"/>
-              <a:t>10.12.2013</a:t>
+              <a:t>11.05.2014</a:t>
             </a:fld>
             <a:endParaRPr lang="ru-RU"/>
           </a:p>
@@ -2670,7 +2686,7 @@
           <a:p>
             <a:fld id="{422E2696-A770-42C1-A308-056B4A80F85B}" type="datetimeFigureOut">
               <a:rPr lang="ru-RU" smtClean="0"/>
-              <a:t>10.12.2013</a:t>
+              <a:t>11.05.2014</a:t>
             </a:fld>
             <a:endParaRPr lang="ru-RU"/>
           </a:p>
@@ -3080,22 +3096,44 @@
             <p:ph type="subTitle" idx="1"/>
           </p:nvPr>
         </p:nvSpPr>
-        <p:spPr/>
-        <p:txBody>
-          <a:bodyPr/>
+        <p:spPr>
+          <a:xfrm>
+            <a:off x="1371600" y="3645024"/>
+            <a:ext cx="6400800" cy="2351112"/>
+          </a:xfrm>
+        </p:spPr>
+        <p:txBody>
+          <a:bodyPr>
+            <a:normAutofit/>
+          </a:bodyPr>
           <a:lstStyle/>
           <a:p>
             <a:pPr algn="r"/>
             <a:r>
               <a:rPr lang="ru-RU" dirty="0" smtClean="0"/>
-              <a:t>Попов Кирилл 444гр</a:t>
-            </a:r>
+              <a:t>Демьяненко Илья</a:t>
+            </a:r>
+            <a:endParaRPr lang="en-US" dirty="0" smtClean="0"/>
           </a:p>
           <a:p>
             <a:pPr algn="r"/>
             <a:r>
               <a:rPr lang="ru-RU" dirty="0" smtClean="0"/>
-              <a:t>Соболев Артем 444гр</a:t>
+              <a:t>Попов Кирилл</a:t>
+            </a:r>
+          </a:p>
+          <a:p>
+            <a:pPr algn="r"/>
+            <a:r>
+              <a:rPr lang="ru-RU" dirty="0" smtClean="0"/>
+              <a:t>Соболев Артем</a:t>
+            </a:r>
+          </a:p>
+          <a:p>
+            <a:pPr algn="r"/>
+            <a:r>
+              <a:rPr lang="ru-RU" dirty="0" smtClean="0"/>
+              <a:t>444 группа</a:t>
             </a:r>
             <a:endParaRPr lang="ru-RU" dirty="0"/>
           </a:p>
@@ -3240,8 +3278,8 @@
               <a:t>социальной сети </a:t>
             </a:r>
             <a:r>
-              <a:rPr lang="en-US" sz="1600" dirty="0" err="1" smtClean="0"/>
-              <a:t>Vkontakte</a:t>
+              <a:rPr lang="ru-RU" sz="1600" dirty="0" err="1" smtClean="0"/>
+              <a:t>ВКонтакте</a:t>
             </a:r>
             <a:endParaRPr lang="ru-RU" sz="1600" dirty="0" smtClean="0"/>
           </a:p>
@@ -3846,8 +3884,8 @@
           <a:lstStyle/>
           <a:p>
             <a:r>
-              <a:rPr lang="ru-RU" dirty="0" smtClean="0"/>
-              <a:t>Бизнес функции</a:t>
+              <a:rPr lang="ru-RU" smtClean="0"/>
+              <a:t>Бизнес-функции</a:t>
             </a:r>
             <a:endParaRPr lang="ru-RU" dirty="0"/>
           </a:p>

</xml_diff>